<commit_message>
flushed out the README file
</commit_message>
<xml_diff>
--- a/quant_technique_comparison.pptx
+++ b/quant_technique_comparison.pptx
@@ -127,6 +127,11 @@
       </a:defRPr>
     </a:lvl9pPr>
   </p:defaultTextStyle>
+  <p:extLst>
+    <p:ext uri="{EFAFB233-063F-42B5-8137-9DF3F51BA10A}">
+      <p15:sldGuideLst xmlns:p15="http://schemas.microsoft.com/office/powerpoint/2012/main"/>
+    </p:ext>
+  </p:extLst>
 </p:presentation>
 </file>
 
@@ -212,7 +217,7 @@
           <a:p>
             <a:fld id="{DECA07FF-6773-0A46-A97E-CBD713B9DF3D}" type="datetimeFigureOut">
               <a:rPr lang="en-US" smtClean="0"/>
-              <a:t>6/18/25</a:t>
+              <a:t>6/20/25</a:t>
             </a:fld>
             <a:endParaRPr lang="en-US"/>
           </a:p>
@@ -1071,15 +1076,15 @@
           <a:p>
             <a:r>
               <a:rPr lang="en-US" dirty="0"/>
-              <a:t>Sample-to-sample scatter plots within biological groups show how consistent the measurements are for samples that should be similar. The cortex samples from the DIA experiments are shown above. Cortex replicates 1 and 2 are a little more similar than the third replicate. The diagonals in the grids have the intensity distributions for each sample, a histogram of the intensities, and a Gaussian kernel smoothed fit. The samples have bimodal intensity distributions. That might be a reflection of the lens proteome where a small number of major lens proteins are very abundant and other proteins are much less abundant (from the small number of epithelial cells or early-stage differentiating fiber cells). The low abundance distribution could also be </a:t>
-            </a:r>
-            <a:r>
-              <a:rPr lang="en-US" dirty="0" err="1"/>
-              <a:t>fromf</a:t>
-            </a:r>
-            <a:r>
-              <a:rPr lang="en-US" dirty="0"/>
-              <a:t> false positive low abundance protein identifications combined with a lot of integrated noise masquerading as signal. Error control for peptide identification in DIA seems to be problematic and far from a solved problem. Random noise matching may not be modeled correctly, or the major source of error are not random matches. m/z space is extremely discrete and cannot be modeled with uniform distributions. I suspect that DIA data is a combination of okay identifications and quant estimates with a large mixture of false positive IDs and mass spec noise added. Distinguishing the okay data from the bad data would seem to be a big issue.</a:t>
+              <a:t>Sample-to-sample scatter plots within biological groups show how consistent the measurements are for samples that should be similar. The cortex samples from the DIA experiments are shown above. Cortex replicates 1 and 2 are a little more similar than the third replicate. The diagonals in the grids have the intensity distributions for each sample, a histogram of the intensities, and a Gaussian kernel smoothed fit. The samples have bimodal intensity distributions. That might be a reflection of the lens proteome where a small number of major lens proteins are very abundant and other proteins are much less abundant (from the small number of epithelial cells or early-stage differentiating fiber cells). The low abundance distribution could also </a:t>
+            </a:r>
+            <a:r>
+              <a:rPr lang="en-US"/>
+              <a:t>be from </a:t>
+            </a:r>
+            <a:r>
+              <a:rPr lang="en-US" dirty="0"/>
+              <a:t>false positive low abundance protein identifications combined with a lot of integrated noise masquerading as signal. Error control for peptide identification in DIA seems to be problematic and far from a solved problem. Random noise matching may not be modeled correctly, or the major source of error are not random matches. m/z space is extremely discrete and cannot be modeled with uniform distributions. I suspect that DIA data is a combination of okay identifications and quant estimates with a large mixture of false positive IDs and mass spec noise added. Distinguishing the okay data from the bad data would seem to be a big issue.</a:t>
             </a:r>
           </a:p>
         </p:txBody>
@@ -2982,7 +2987,7 @@
           <a:p>
             <a:fld id="{F3CC2B43-6988-3445-8F73-D492BA59697D}" type="datetimeFigureOut">
               <a:rPr lang="en-US" smtClean="0"/>
-              <a:t>6/18/25</a:t>
+              <a:t>6/20/25</a:t>
             </a:fld>
             <a:endParaRPr lang="en-US"/>
           </a:p>
@@ -3180,7 +3185,7 @@
           <a:p>
             <a:fld id="{F3CC2B43-6988-3445-8F73-D492BA59697D}" type="datetimeFigureOut">
               <a:rPr lang="en-US" smtClean="0"/>
-              <a:t>6/18/25</a:t>
+              <a:t>6/20/25</a:t>
             </a:fld>
             <a:endParaRPr lang="en-US"/>
           </a:p>
@@ -3388,7 +3393,7 @@
           <a:p>
             <a:fld id="{F3CC2B43-6988-3445-8F73-D492BA59697D}" type="datetimeFigureOut">
               <a:rPr lang="en-US" smtClean="0"/>
-              <a:t>6/18/25</a:t>
+              <a:t>6/20/25</a:t>
             </a:fld>
             <a:endParaRPr lang="en-US"/>
           </a:p>
@@ -3586,7 +3591,7 @@
           <a:p>
             <a:fld id="{F3CC2B43-6988-3445-8F73-D492BA59697D}" type="datetimeFigureOut">
               <a:rPr lang="en-US" smtClean="0"/>
-              <a:t>6/18/25</a:t>
+              <a:t>6/20/25</a:t>
             </a:fld>
             <a:endParaRPr lang="en-US"/>
           </a:p>
@@ -3861,7 +3866,7 @@
           <a:p>
             <a:fld id="{F3CC2B43-6988-3445-8F73-D492BA59697D}" type="datetimeFigureOut">
               <a:rPr lang="en-US" smtClean="0"/>
-              <a:t>6/18/25</a:t>
+              <a:t>6/20/25</a:t>
             </a:fld>
             <a:endParaRPr lang="en-US"/>
           </a:p>
@@ -4126,7 +4131,7 @@
           <a:p>
             <a:fld id="{F3CC2B43-6988-3445-8F73-D492BA59697D}" type="datetimeFigureOut">
               <a:rPr lang="en-US" smtClean="0"/>
-              <a:t>6/18/25</a:t>
+              <a:t>6/20/25</a:t>
             </a:fld>
             <a:endParaRPr lang="en-US"/>
           </a:p>
@@ -4538,7 +4543,7 @@
           <a:p>
             <a:fld id="{F3CC2B43-6988-3445-8F73-D492BA59697D}" type="datetimeFigureOut">
               <a:rPr lang="en-US" smtClean="0"/>
-              <a:t>6/18/25</a:t>
+              <a:t>6/20/25</a:t>
             </a:fld>
             <a:endParaRPr lang="en-US"/>
           </a:p>
@@ -4679,7 +4684,7 @@
           <a:p>
             <a:fld id="{F3CC2B43-6988-3445-8F73-D492BA59697D}" type="datetimeFigureOut">
               <a:rPr lang="en-US" smtClean="0"/>
-              <a:t>6/18/25</a:t>
+              <a:t>6/20/25</a:t>
             </a:fld>
             <a:endParaRPr lang="en-US"/>
           </a:p>
@@ -4792,7 +4797,7 @@
           <a:p>
             <a:fld id="{F3CC2B43-6988-3445-8F73-D492BA59697D}" type="datetimeFigureOut">
               <a:rPr lang="en-US" smtClean="0"/>
-              <a:t>6/18/25</a:t>
+              <a:t>6/20/25</a:t>
             </a:fld>
             <a:endParaRPr lang="en-US"/>
           </a:p>
@@ -5103,7 +5108,7 @@
           <a:p>
             <a:fld id="{F3CC2B43-6988-3445-8F73-D492BA59697D}" type="datetimeFigureOut">
               <a:rPr lang="en-US" smtClean="0"/>
-              <a:t>6/18/25</a:t>
+              <a:t>6/20/25</a:t>
             </a:fld>
             <a:endParaRPr lang="en-US"/>
           </a:p>
@@ -5391,7 +5396,7 @@
           <a:p>
             <a:fld id="{F3CC2B43-6988-3445-8F73-D492BA59697D}" type="datetimeFigureOut">
               <a:rPr lang="en-US" smtClean="0"/>
-              <a:t>6/18/25</a:t>
+              <a:t>6/20/25</a:t>
             </a:fld>
             <a:endParaRPr lang="en-US"/>
           </a:p>
@@ -5632,7 +5637,7 @@
           <a:p>
             <a:fld id="{F3CC2B43-6988-3445-8F73-D492BA59697D}" type="datetimeFigureOut">
               <a:rPr lang="en-US" smtClean="0"/>
-              <a:t>6/18/25</a:t>
+              <a:t>6/20/25</a:t>
             </a:fld>
             <a:endParaRPr lang="en-US"/>
           </a:p>

</xml_diff>